<commit_message>
Added Symbolic Regression and Results to presentation
</commit_message>
<xml_diff>
--- a/Documentation/Beer Data Presentation - Resampling Task.pptx
+++ b/Documentation/Beer Data Presentation - Resampling Task.pptx
@@ -11,7 +11,8 @@
     <p:sldId id="258" r:id="rId5"/>
     <p:sldId id="261" r:id="rId6"/>
     <p:sldId id="262" r:id="rId7"/>
-    <p:sldId id="263" r:id="rId8"/>
+    <p:sldId id="265" r:id="rId8"/>
+    <p:sldId id="263" r:id="rId9"/>
   </p:sldIdLst>
   <p:sldSz cx="12192000" cy="6858000"/>
   <p:notesSz cx="6858000" cy="9144000"/>
@@ -110,6 +111,11 @@
       </a:defRPr>
     </a:lvl9pPr>
   </p:defaultTextStyle>
+  <p:extLst>
+    <p:ext uri="{EFAFB233-063F-42B5-8137-9DF3F51BA10A}">
+      <p15:sldGuideLst xmlns:p15="http://schemas.microsoft.com/office/powerpoint/2012/main"/>
+    </p:ext>
+  </p:extLst>
 </p:presentation>
 </file>
 
@@ -6879,8 +6885,12 @@
           <a:lstStyle/>
           <a:p>
             <a:r>
-              <a:rPr lang="de-AT" dirty="0"/>
-              <a:t>RESULTS SYMBOLIC REGRESSION</a:t>
+              <a:rPr lang="de-AT" dirty="0" err="1"/>
+              <a:t>Symbolic</a:t>
+            </a:r>
+            <a:r>
+              <a:rPr lang="de-AT" dirty="0"/>
+              <a:t> Regression Task</a:t>
             </a:r>
           </a:p>
         </p:txBody>
@@ -6901,18 +6911,150 @@
             <p:ph idx="1"/>
           </p:nvPr>
         </p:nvSpPr>
-        <p:spPr/>
+        <p:spPr>
+          <a:xfrm>
+            <a:off x="152400" y="1380565"/>
+            <a:ext cx="11362265" cy="992521"/>
+          </a:xfrm>
+        </p:spPr>
         <p:txBody>
           <a:bodyPr/>
           <a:lstStyle/>
           <a:p>
             <a:r>
               <a:rPr lang="de-AT" dirty="0"/>
-              <a:t>TODO</a:t>
-            </a:r>
-          </a:p>
-        </p:txBody>
-      </p:sp>
+              <a:t>Different </a:t>
+            </a:r>
+            <a:r>
+              <a:rPr lang="de-AT" dirty="0" err="1"/>
+              <a:t>Selectors</a:t>
+            </a:r>
+            <a:r>
+              <a:rPr lang="de-AT" dirty="0"/>
+              <a:t> and Crossovers </a:t>
+            </a:r>
+            <a:r>
+              <a:rPr lang="de-AT" dirty="0" err="1"/>
+              <a:t>for</a:t>
+            </a:r>
+            <a:r>
+              <a:rPr lang="de-AT" dirty="0"/>
+              <a:t> – original </a:t>
+            </a:r>
+            <a:r>
+              <a:rPr lang="de-AT" dirty="0" err="1"/>
+              <a:t>data</a:t>
+            </a:r>
+            <a:r>
+              <a:rPr lang="de-AT" dirty="0"/>
+              <a:t> – sample </a:t>
+            </a:r>
+            <a:r>
+              <a:rPr lang="de-AT" dirty="0" err="1"/>
+              <a:t>data</a:t>
+            </a:r>
+            <a:r>
+              <a:rPr lang="de-AT" dirty="0"/>
+              <a:t> – </a:t>
+            </a:r>
+            <a:r>
+              <a:rPr lang="de-AT" dirty="0" err="1"/>
+              <a:t>mixed</a:t>
+            </a:r>
+            <a:r>
+              <a:rPr lang="de-AT" dirty="0"/>
+              <a:t> </a:t>
+            </a:r>
+            <a:r>
+              <a:rPr lang="de-AT" dirty="0" err="1"/>
+              <a:t>data</a:t>
+            </a:r>
+            <a:endParaRPr lang="de-AT" dirty="0"/>
+          </a:p>
+          <a:p>
+            <a:r>
+              <a:rPr lang="de-AT" dirty="0"/>
+              <a:t>Best </a:t>
+            </a:r>
+            <a:r>
+              <a:rPr lang="de-AT" dirty="0" err="1"/>
+              <a:t>results</a:t>
+            </a:r>
+            <a:r>
+              <a:rPr lang="de-AT" dirty="0"/>
+              <a:t> – original </a:t>
+            </a:r>
+            <a:r>
+              <a:rPr lang="de-AT" dirty="0" err="1"/>
+              <a:t>data</a:t>
+            </a:r>
+            <a:r>
+              <a:rPr lang="de-AT" dirty="0"/>
+              <a:t> </a:t>
+            </a:r>
+            <a:r>
+              <a:rPr lang="de-AT" dirty="0" err="1"/>
+              <a:t>with</a:t>
+            </a:r>
+            <a:r>
+              <a:rPr lang="de-AT" dirty="0"/>
+              <a:t> </a:t>
+            </a:r>
+            <a:r>
+              <a:rPr lang="de-AT" dirty="0" err="1"/>
+              <a:t>Deterministic</a:t>
+            </a:r>
+            <a:r>
+              <a:rPr lang="de-AT" dirty="0"/>
+              <a:t> Best Crossover – Tournament </a:t>
+            </a:r>
+            <a:r>
+              <a:rPr lang="de-AT" dirty="0" err="1"/>
+              <a:t>Selector</a:t>
+            </a:r>
+            <a:r>
+              <a:rPr lang="de-AT" dirty="0"/>
+              <a:t> Size 5</a:t>
+            </a:r>
+          </a:p>
+        </p:txBody>
+      </p:sp>
+      <p:pic>
+        <p:nvPicPr>
+          <p:cNvPr id="7" name="Grafik 6" descr="Ein Bild, das Diagramm, Text, Reihe, parallel enthält.&#10;&#10;Automatisch generierte Beschreibung">
+            <a:extLst>
+              <a:ext uri="{FF2B5EF4-FFF2-40B4-BE49-F238E27FC236}">
+                <a16:creationId xmlns:a16="http://schemas.microsoft.com/office/drawing/2014/main" id="{5567BAF3-F6B1-AE21-8B3F-91FD153C5253}"/>
+              </a:ext>
+            </a:extLst>
+          </p:cNvPr>
+          <p:cNvPicPr>
+            <a:picLocks noChangeAspect="1"/>
+          </p:cNvPicPr>
+          <p:nvPr/>
+        </p:nvPicPr>
+        <p:blipFill>
+          <a:blip r:embed="rId2">
+            <a:extLst>
+              <a:ext uri="{28A0092B-C50C-407E-A947-70E740481C1C}">
+                <a14:useLocalDpi xmlns:a14="http://schemas.microsoft.com/office/drawing/2010/main" val="0"/>
+              </a:ext>
+            </a:extLst>
+          </a:blip>
+          <a:stretch>
+            <a:fillRect/>
+          </a:stretch>
+        </p:blipFill>
+        <p:spPr>
+          <a:xfrm>
+            <a:off x="832757" y="2187842"/>
+            <a:ext cx="10526486" cy="4670158"/>
+          </a:xfrm>
+          <a:prstGeom prst="rect">
+            <a:avLst/>
+          </a:prstGeom>
+        </p:spPr>
+      </p:pic>
     </p:spTree>
     <p:extLst>
       <p:ext uri="{BB962C8B-B14F-4D97-AF65-F5344CB8AC3E}">
@@ -6948,6 +7090,310 @@
           <p:cNvPr id="2" name="Titel 1">
             <a:extLst>
               <a:ext uri="{FF2B5EF4-FFF2-40B4-BE49-F238E27FC236}">
+                <a16:creationId xmlns:a16="http://schemas.microsoft.com/office/drawing/2014/main" id="{BD9A90D8-5176-572B-C483-89580EFB4FFB}"/>
+              </a:ext>
+            </a:extLst>
+          </p:cNvPr>
+          <p:cNvSpPr>
+            <a:spLocks noGrp="1"/>
+          </p:cNvSpPr>
+          <p:nvPr>
+            <p:ph type="title"/>
+          </p:nvPr>
+        </p:nvSpPr>
+        <p:spPr>
+          <a:xfrm>
+            <a:off x="677334" y="609600"/>
+            <a:ext cx="8596668" cy="670560"/>
+          </a:xfrm>
+        </p:spPr>
+        <p:txBody>
+          <a:bodyPr/>
+          <a:lstStyle/>
+          <a:p>
+            <a:r>
+              <a:rPr lang="de-AT" dirty="0" err="1"/>
+              <a:t>Symbolic</a:t>
+            </a:r>
+            <a:r>
+              <a:rPr lang="de-AT" dirty="0"/>
+              <a:t> Regression Task - </a:t>
+            </a:r>
+            <a:r>
+              <a:rPr lang="de-AT" dirty="0" err="1"/>
+              <a:t>Insights</a:t>
+            </a:r>
+            <a:endParaRPr lang="de-AT" dirty="0"/>
+          </a:p>
+        </p:txBody>
+      </p:sp>
+      <p:sp>
+        <p:nvSpPr>
+          <p:cNvPr id="3" name="Textplatzhalter 2">
+            <a:extLst>
+              <a:ext uri="{FF2B5EF4-FFF2-40B4-BE49-F238E27FC236}">
+                <a16:creationId xmlns:a16="http://schemas.microsoft.com/office/drawing/2014/main" id="{7FABFF2F-AF5D-6997-9D84-35835239B5E5}"/>
+              </a:ext>
+            </a:extLst>
+          </p:cNvPr>
+          <p:cNvSpPr>
+            <a:spLocks noGrp="1"/>
+          </p:cNvSpPr>
+          <p:nvPr>
+            <p:ph type="body" idx="1"/>
+          </p:nvPr>
+        </p:nvSpPr>
+        <p:spPr>
+          <a:xfrm>
+            <a:off x="675744" y="1280160"/>
+            <a:ext cx="4185623" cy="576262"/>
+          </a:xfrm>
+        </p:spPr>
+        <p:txBody>
+          <a:bodyPr/>
+          <a:lstStyle/>
+          <a:p>
+            <a:r>
+              <a:rPr lang="de-AT" dirty="0"/>
+              <a:t>Original Data</a:t>
+            </a:r>
+          </a:p>
+        </p:txBody>
+      </p:sp>
+      <p:sp>
+        <p:nvSpPr>
+          <p:cNvPr id="4" name="Inhaltsplatzhalter 3">
+            <a:extLst>
+              <a:ext uri="{FF2B5EF4-FFF2-40B4-BE49-F238E27FC236}">
+                <a16:creationId xmlns:a16="http://schemas.microsoft.com/office/drawing/2014/main" id="{C8F08AA9-6B3D-459D-E082-E4762F04E6F7}"/>
+              </a:ext>
+            </a:extLst>
+          </p:cNvPr>
+          <p:cNvSpPr>
+            <a:spLocks noGrp="1"/>
+          </p:cNvSpPr>
+          <p:nvPr>
+            <p:ph sz="half" idx="2"/>
+          </p:nvPr>
+        </p:nvSpPr>
+        <p:spPr>
+          <a:xfrm>
+            <a:off x="675739" y="1856422"/>
+            <a:ext cx="4185623" cy="4184940"/>
+          </a:xfrm>
+        </p:spPr>
+        <p:txBody>
+          <a:bodyPr/>
+          <a:lstStyle/>
+          <a:p>
+            <a:r>
+              <a:rPr lang="de-AT" dirty="0"/>
+              <a:t>Model Depth: 10 | </a:t>
+            </a:r>
+            <a:r>
+              <a:rPr lang="de-AT" dirty="0" err="1"/>
+              <a:t>Length</a:t>
+            </a:r>
+            <a:r>
+              <a:rPr lang="de-AT" dirty="0"/>
+              <a:t>: 27</a:t>
+            </a:r>
+          </a:p>
+          <a:p>
+            <a:r>
+              <a:rPr lang="de-AT" dirty="0"/>
+              <a:t>R2 Test: 0,03 | R2 Training: 0,33</a:t>
+            </a:r>
+          </a:p>
+          <a:p>
+            <a:endParaRPr lang="de-AT" dirty="0"/>
+          </a:p>
+        </p:txBody>
+      </p:sp>
+      <p:sp>
+        <p:nvSpPr>
+          <p:cNvPr id="5" name="Textplatzhalter 4">
+            <a:extLst>
+              <a:ext uri="{FF2B5EF4-FFF2-40B4-BE49-F238E27FC236}">
+                <a16:creationId xmlns:a16="http://schemas.microsoft.com/office/drawing/2014/main" id="{D626DE7D-68AF-CF83-DB37-EF890874F558}"/>
+              </a:ext>
+            </a:extLst>
+          </p:cNvPr>
+          <p:cNvSpPr>
+            <a:spLocks noGrp="1"/>
+          </p:cNvSpPr>
+          <p:nvPr>
+            <p:ph type="body" sz="quarter" idx="3"/>
+          </p:nvPr>
+        </p:nvSpPr>
+        <p:spPr>
+          <a:xfrm>
+            <a:off x="5088384" y="1280160"/>
+            <a:ext cx="4185618" cy="576262"/>
+          </a:xfrm>
+        </p:spPr>
+        <p:txBody>
+          <a:bodyPr/>
+          <a:lstStyle/>
+          <a:p>
+            <a:r>
+              <a:rPr lang="de-AT" dirty="0"/>
+              <a:t>Sample Data</a:t>
+            </a:r>
+          </a:p>
+        </p:txBody>
+      </p:sp>
+      <p:sp>
+        <p:nvSpPr>
+          <p:cNvPr id="6" name="Inhaltsplatzhalter 5">
+            <a:extLst>
+              <a:ext uri="{FF2B5EF4-FFF2-40B4-BE49-F238E27FC236}">
+                <a16:creationId xmlns:a16="http://schemas.microsoft.com/office/drawing/2014/main" id="{FF52ED41-74D4-C9DE-BA38-3ECABE7E8373}"/>
+              </a:ext>
+            </a:extLst>
+          </p:cNvPr>
+          <p:cNvSpPr>
+            <a:spLocks noGrp="1"/>
+          </p:cNvSpPr>
+          <p:nvPr>
+            <p:ph sz="quarter" idx="4"/>
+          </p:nvPr>
+        </p:nvSpPr>
+        <p:spPr>
+          <a:xfrm>
+            <a:off x="5088384" y="1856423"/>
+            <a:ext cx="4185617" cy="4184940"/>
+          </a:xfrm>
+        </p:spPr>
+        <p:txBody>
+          <a:bodyPr/>
+          <a:lstStyle/>
+          <a:p>
+            <a:r>
+              <a:rPr lang="de-AT" dirty="0"/>
+              <a:t>Model Depth: 8 | </a:t>
+            </a:r>
+            <a:r>
+              <a:rPr lang="de-AT" dirty="0" err="1"/>
+              <a:t>Length</a:t>
+            </a:r>
+            <a:r>
+              <a:rPr lang="de-AT" dirty="0"/>
+              <a:t>: 17</a:t>
+            </a:r>
+          </a:p>
+          <a:p>
+            <a:r>
+              <a:rPr lang="de-AT" dirty="0"/>
+              <a:t>R2 Test: 0,01 | R2 Training: 0,08</a:t>
+            </a:r>
+          </a:p>
+          <a:p>
+            <a:endParaRPr lang="de-AT" dirty="0"/>
+          </a:p>
+        </p:txBody>
+      </p:sp>
+      <p:pic>
+        <p:nvPicPr>
+          <p:cNvPr id="8" name="Grafik 7">
+            <a:extLst>
+              <a:ext uri="{FF2B5EF4-FFF2-40B4-BE49-F238E27FC236}">
+                <a16:creationId xmlns:a16="http://schemas.microsoft.com/office/drawing/2014/main" id="{A8DB9D23-F097-E490-2212-929622AF536E}"/>
+              </a:ext>
+            </a:extLst>
+          </p:cNvPr>
+          <p:cNvPicPr>
+            <a:picLocks noChangeAspect="1"/>
+          </p:cNvPicPr>
+          <p:nvPr/>
+        </p:nvPicPr>
+        <p:blipFill>
+          <a:blip r:embed="rId2"/>
+          <a:stretch>
+            <a:fillRect/>
+          </a:stretch>
+        </p:blipFill>
+        <p:spPr>
+          <a:xfrm>
+            <a:off x="5088383" y="2834565"/>
+            <a:ext cx="4068862" cy="3703395"/>
+          </a:xfrm>
+          <a:prstGeom prst="rect">
+            <a:avLst/>
+          </a:prstGeom>
+        </p:spPr>
+      </p:pic>
+      <p:pic>
+        <p:nvPicPr>
+          <p:cNvPr id="10" name="Grafik 9" descr="Ein Bild, das Diagramm, Text, Plan, Reihe enthält.&#10;&#10;Automatisch generierte Beschreibung">
+            <a:extLst>
+              <a:ext uri="{FF2B5EF4-FFF2-40B4-BE49-F238E27FC236}">
+                <a16:creationId xmlns:a16="http://schemas.microsoft.com/office/drawing/2014/main" id="{F9011438-1E99-0BDA-BF8A-C0D925598DD3}"/>
+              </a:ext>
+            </a:extLst>
+          </p:cNvPr>
+          <p:cNvPicPr>
+            <a:picLocks noChangeAspect="1"/>
+          </p:cNvPicPr>
+          <p:nvPr/>
+        </p:nvPicPr>
+        <p:blipFill>
+          <a:blip r:embed="rId3">
+            <a:extLst>
+              <a:ext uri="{28A0092B-C50C-407E-A947-70E740481C1C}">
+                <a14:useLocalDpi xmlns:a14="http://schemas.microsoft.com/office/drawing/2010/main" val="0"/>
+              </a:ext>
+            </a:extLst>
+          </a:blip>
+          <a:stretch>
+            <a:fillRect/>
+          </a:stretch>
+        </p:blipFill>
+        <p:spPr>
+          <a:xfrm>
+            <a:off x="457776" y="2944935"/>
+            <a:ext cx="4513851" cy="3593025"/>
+          </a:xfrm>
+          <a:prstGeom prst="rect">
+            <a:avLst/>
+          </a:prstGeom>
+        </p:spPr>
+      </p:pic>
+    </p:spTree>
+    <p:extLst>
+      <p:ext uri="{BB962C8B-B14F-4D97-AF65-F5344CB8AC3E}">
+        <p14:creationId xmlns:p14="http://schemas.microsoft.com/office/powerpoint/2010/main" val="2984077546"/>
+      </p:ext>
+    </p:extLst>
+  </p:cSld>
+  <p:clrMapOvr>
+    <a:masterClrMapping/>
+  </p:clrMapOvr>
+</p:sld>
+</file>
+
+<file path=ppt/slides/slide8.xml><?xml version="1.0" encoding="utf-8"?>
+<p:sld xmlns:a="http://schemas.openxmlformats.org/drawingml/2006/main" xmlns:r="http://schemas.openxmlformats.org/officeDocument/2006/relationships" xmlns:p="http://schemas.openxmlformats.org/presentationml/2006/main">
+  <p:cSld>
+    <p:spTree>
+      <p:nvGrpSpPr>
+        <p:cNvPr id="1" name=""/>
+        <p:cNvGrpSpPr/>
+        <p:nvPr/>
+      </p:nvGrpSpPr>
+      <p:grpSpPr>
+        <a:xfrm>
+          <a:off x="0" y="0"/>
+          <a:ext cx="0" cy="0"/>
+          <a:chOff x="0" y="0"/>
+          <a:chExt cx="0" cy="0"/>
+        </a:xfrm>
+      </p:grpSpPr>
+      <p:sp>
+        <p:nvSpPr>
+          <p:cNvPr id="2" name="Titel 1">
+            <a:extLst>
+              <a:ext uri="{FF2B5EF4-FFF2-40B4-BE49-F238E27FC236}">
                 <a16:creationId xmlns:a16="http://schemas.microsoft.com/office/drawing/2014/main" id="{3662AAD8-CAFD-51B7-A0C0-FB46C70BDD69}"/>
               </a:ext>
             </a:extLst>
@@ -7102,7 +7548,7 @@
             </a:r>
             <a:r>
               <a:rPr lang="de-AT" dirty="0" err="1"/>
-              <a:t>with</a:t>
+              <a:t>quality</a:t>
             </a:r>
             <a:r>
               <a:rPr lang="de-AT" dirty="0"/>
@@ -7110,7 +7556,7 @@
             </a:r>
             <a:r>
               <a:rPr lang="de-AT" dirty="0" err="1"/>
-              <a:t>lower</a:t>
+              <a:t>rather</a:t>
             </a:r>
             <a:r>
               <a:rPr lang="de-AT" dirty="0"/>
@@ -7118,26 +7564,18 @@
             </a:r>
             <a:r>
               <a:rPr lang="de-AT" dirty="0" err="1"/>
-              <a:t>quality</a:t>
+              <a:t>low</a:t>
             </a:r>
             <a:endParaRPr lang="de-AT" dirty="0"/>
           </a:p>
           <a:p>
             <a:r>
               <a:rPr lang="de-AT" dirty="0"/>
-              <a:t>Clustering </a:t>
-            </a:r>
-            <a:r>
-              <a:rPr lang="de-AT" dirty="0" err="1"/>
-              <a:t>did</a:t>
-            </a:r>
-            <a:r>
-              <a:rPr lang="de-AT" dirty="0"/>
-              <a:t> not </a:t>
-            </a:r>
-            <a:r>
-              <a:rPr lang="de-AT" dirty="0" err="1"/>
-              <a:t>work</a:t>
+              <a:t>Model </a:t>
+            </a:r>
+            <a:r>
+              <a:rPr lang="de-AT" dirty="0" err="1"/>
+              <a:t>results</a:t>
             </a:r>
             <a:r>
               <a:rPr lang="de-AT" dirty="0"/>
@@ -7145,44 +7583,33 @@
             </a:r>
             <a:r>
               <a:rPr lang="de-AT" dirty="0" err="1"/>
-              <a:t>properly</a:t>
-            </a:r>
-            <a:r>
-              <a:rPr lang="de-AT" dirty="0"/>
-              <a:t>, </a:t>
-            </a:r>
-            <a:r>
-              <a:rPr lang="de-AT" dirty="0" err="1"/>
-              <a:t>even</a:t>
-            </a:r>
-            <a:r>
-              <a:rPr lang="de-AT" dirty="0"/>
-              <a:t> after </a:t>
-            </a:r>
-            <a:r>
-              <a:rPr lang="de-AT" dirty="0" err="1"/>
-              <a:t>defining</a:t>
-            </a:r>
-            <a:r>
-              <a:rPr lang="de-AT" dirty="0"/>
-              <a:t> Quality </a:t>
-            </a:r>
-            <a:r>
-              <a:rPr lang="de-AT" dirty="0" err="1"/>
-              <a:t>as</a:t>
-            </a:r>
-            <a:r>
-              <a:rPr lang="de-AT" dirty="0"/>
-              <a:t> a </a:t>
-            </a:r>
-            <a:r>
-              <a:rPr lang="de-AT" dirty="0" err="1"/>
-              <a:t>categorical</a:t>
-            </a:r>
-            <a:r>
-              <a:rPr lang="de-AT" dirty="0"/>
-              <a:t> variable</a:t>
-            </a:r>
+              <a:t>low</a:t>
+            </a:r>
+            <a:r>
+              <a:rPr lang="de-AT" dirty="0"/>
+              <a:t> – </a:t>
+            </a:r>
+            <a:r>
+              <a:rPr lang="de-AT" dirty="0" err="1"/>
+              <a:t>overfitting</a:t>
+            </a:r>
+            <a:r>
+              <a:rPr lang="de-AT" dirty="0"/>
+              <a:t> </a:t>
+            </a:r>
+            <a:r>
+              <a:rPr lang="de-AT" dirty="0" err="1"/>
+              <a:t>symbolic</a:t>
+            </a:r>
+            <a:r>
+              <a:rPr lang="de-AT" dirty="0"/>
+              <a:t> </a:t>
+            </a:r>
+            <a:r>
+              <a:rPr lang="de-AT" dirty="0" err="1"/>
+              <a:t>regression</a:t>
+            </a:r>
+            <a:endParaRPr lang="de-AT" dirty="0"/>
           </a:p>
         </p:txBody>
       </p:sp>

</xml_diff>

<commit_message>
added images in Documentation, added images in Plots, added Classification.hl file without results, otherwise it would be to large > 141 MB
</commit_message>
<xml_diff>
--- a/Documentation/Beer Data Presentation - Resampling Task.pptx
+++ b/Documentation/Beer Data Presentation - Resampling Task.pptx
@@ -117,6 +117,98 @@
     </p:ext>
   </p:extLst>
 </p:presentation>
+</file>
+
+<file path=ppt/revisionInfo.xml><?xml version="1.0" encoding="utf-8"?>
+<p1510:revInfo xmlns:a="http://schemas.openxmlformats.org/drawingml/2006/main" xmlns:r="http://schemas.openxmlformats.org/officeDocument/2006/relationships" xmlns:p1510="http://schemas.microsoft.com/office/powerpoint/2015/10/main">
+  <p1510:revLst>
+    <p1510:client id="{6FF64505-D837-4B4E-811A-3D0F901EFB2F}" v="3" dt="2024-06-18T13:41:07.624"/>
+  </p1510:revLst>
+</p1510:revInfo>
+</file>
+
+<file path=ppt/changesInfos/changesInfo1.xml><?xml version="1.0" encoding="utf-8"?>
+<pc:chgInfo xmlns:a="http://schemas.openxmlformats.org/drawingml/2006/main" xmlns:r="http://schemas.openxmlformats.org/officeDocument/2006/relationships" xmlns:ac="http://schemas.microsoft.com/office/drawing/2013/main/command" xmlns:pc="http://schemas.microsoft.com/office/powerpoint/2013/main/command">
+  <pc:docChgLst>
+    <pc:chgData name="Debnar Marcus - s2310454007" userId="a4131e1e-6e67-4fcb-9b71-1c3d9633441c" providerId="ADAL" clId="{6FF64505-D837-4B4E-811A-3D0F901EFB2F}"/>
+    <pc:docChg chg="custSel modSld">
+      <pc:chgData name="Debnar Marcus - s2310454007" userId="a4131e1e-6e67-4fcb-9b71-1c3d9633441c" providerId="ADAL" clId="{6FF64505-D837-4B4E-811A-3D0F901EFB2F}" dt="2024-06-18T13:41:23.029" v="15" actId="1076"/>
+      <pc:docMkLst>
+        <pc:docMk/>
+      </pc:docMkLst>
+      <pc:sldChg chg="addSp delSp modSp mod modClrScheme chgLayout">
+        <pc:chgData name="Debnar Marcus - s2310454007" userId="a4131e1e-6e67-4fcb-9b71-1c3d9633441c" providerId="ADAL" clId="{6FF64505-D837-4B4E-811A-3D0F901EFB2F}" dt="2024-06-18T13:41:23.029" v="15" actId="1076"/>
+        <pc:sldMkLst>
+          <pc:docMk/>
+          <pc:sldMk cId="421467146" sldId="261"/>
+        </pc:sldMkLst>
+        <pc:spChg chg="mod ord">
+          <ac:chgData name="Debnar Marcus - s2310454007" userId="a4131e1e-6e67-4fcb-9b71-1c3d9633441c" providerId="ADAL" clId="{6FF64505-D837-4B4E-811A-3D0F901EFB2F}" dt="2024-06-18T13:40:28.230" v="1" actId="700"/>
+          <ac:spMkLst>
+            <pc:docMk/>
+            <pc:sldMk cId="421467146" sldId="261"/>
+            <ac:spMk id="2" creationId="{92FCF6C0-AB97-ECA1-8FAE-F74351EB324F}"/>
+          </ac:spMkLst>
+        </pc:spChg>
+        <pc:spChg chg="mod ord">
+          <ac:chgData name="Debnar Marcus - s2310454007" userId="a4131e1e-6e67-4fcb-9b71-1c3d9633441c" providerId="ADAL" clId="{6FF64505-D837-4B4E-811A-3D0F901EFB2F}" dt="2024-06-18T13:40:28.230" v="1" actId="700"/>
+          <ac:spMkLst>
+            <pc:docMk/>
+            <pc:sldMk cId="421467146" sldId="261"/>
+            <ac:spMk id="3" creationId="{1424AF6F-70EE-6910-E7C7-428C63CE5472}"/>
+          </ac:spMkLst>
+        </pc:spChg>
+        <pc:spChg chg="add del mod ord">
+          <ac:chgData name="Debnar Marcus - s2310454007" userId="a4131e1e-6e67-4fcb-9b71-1c3d9633441c" providerId="ADAL" clId="{6FF64505-D837-4B4E-811A-3D0F901EFB2F}" dt="2024-06-18T13:40:31.513" v="2"/>
+          <ac:spMkLst>
+            <pc:docMk/>
+            <pc:sldMk cId="421467146" sldId="261"/>
+            <ac:spMk id="4" creationId="{F022D668-EDB9-E42C-7BB2-003E556EA407}"/>
+          </ac:spMkLst>
+        </pc:spChg>
+        <pc:picChg chg="add mod">
+          <ac:chgData name="Debnar Marcus - s2310454007" userId="a4131e1e-6e67-4fcb-9b71-1c3d9633441c" providerId="ADAL" clId="{6FF64505-D837-4B4E-811A-3D0F901EFB2F}" dt="2024-06-18T13:40:56.199" v="9" actId="1076"/>
+          <ac:picMkLst>
+            <pc:docMk/>
+            <pc:sldMk cId="421467146" sldId="261"/>
+            <ac:picMk id="6" creationId="{4A811720-F0C7-7F67-65F8-1C8F6CE1EF88}"/>
+          </ac:picMkLst>
+        </pc:picChg>
+        <pc:picChg chg="add del mod">
+          <ac:chgData name="Debnar Marcus - s2310454007" userId="a4131e1e-6e67-4fcb-9b71-1c3d9633441c" providerId="ADAL" clId="{6FF64505-D837-4B4E-811A-3D0F901EFB2F}" dt="2024-06-18T13:41:09.308" v="13" actId="478"/>
+          <ac:picMkLst>
+            <pc:docMk/>
+            <pc:sldMk cId="421467146" sldId="261"/>
+            <ac:picMk id="8" creationId="{0403D680-83BF-D71C-FC15-4A6FA1BA3119}"/>
+          </ac:picMkLst>
+        </pc:picChg>
+        <pc:picChg chg="add mod">
+          <ac:chgData name="Debnar Marcus - s2310454007" userId="a4131e1e-6e67-4fcb-9b71-1c3d9633441c" providerId="ADAL" clId="{6FF64505-D837-4B4E-811A-3D0F901EFB2F}" dt="2024-06-18T13:41:23.029" v="15" actId="1076"/>
+          <ac:picMkLst>
+            <pc:docMk/>
+            <pc:sldMk cId="421467146" sldId="261"/>
+            <ac:picMk id="10" creationId="{4770E9F8-8A12-21ED-6AEA-26F04998D43D}"/>
+          </ac:picMkLst>
+        </pc:picChg>
+      </pc:sldChg>
+      <pc:sldChg chg="modSp mod">
+        <pc:chgData name="Debnar Marcus - s2310454007" userId="a4131e1e-6e67-4fcb-9b71-1c3d9633441c" providerId="ADAL" clId="{6FF64505-D837-4B4E-811A-3D0F901EFB2F}" dt="2024-06-18T13:38:44.132" v="0" actId="1076"/>
+        <pc:sldMkLst>
+          <pc:docMk/>
+          <pc:sldMk cId="986781203" sldId="262"/>
+        </pc:sldMkLst>
+        <pc:picChg chg="mod">
+          <ac:chgData name="Debnar Marcus - s2310454007" userId="a4131e1e-6e67-4fcb-9b71-1c3d9633441c" providerId="ADAL" clId="{6FF64505-D837-4B4E-811A-3D0F901EFB2F}" dt="2024-06-18T13:38:44.132" v="0" actId="1076"/>
+          <ac:picMkLst>
+            <pc:docMk/>
+            <pc:sldMk cId="986781203" sldId="262"/>
+            <ac:picMk id="7" creationId="{5567BAF3-F6B1-AE21-8B3F-91FD153C5253}"/>
+          </ac:picMkLst>
+        </pc:picChg>
+      </pc:sldChg>
+    </pc:docChg>
+  </pc:docChgLst>
+</pc:chgInfo>
 </file>
 
 <file path=ppt/slideLayouts/slideLayout1.xml><?xml version="1.0" encoding="utf-8"?>
@@ -841,7 +933,7 @@
           <a:p>
             <a:fld id="{27EF7898-89F7-4221-9DBC-7891136EA364}" type="datetimeFigureOut">
               <a:rPr lang="de-AT" smtClean="0"/>
-              <a:t>14.06.2024</a:t>
+              <a:t>18.06.2024</a:t>
             </a:fld>
             <a:endParaRPr lang="de-AT"/>
           </a:p>
@@ -1092,7 +1184,7 @@
           <a:p>
             <a:fld id="{27EF7898-89F7-4221-9DBC-7891136EA364}" type="datetimeFigureOut">
               <a:rPr lang="de-AT" smtClean="0"/>
-              <a:t>14.06.2024</a:t>
+              <a:t>18.06.2024</a:t>
             </a:fld>
             <a:endParaRPr lang="de-AT"/>
           </a:p>
@@ -1406,7 +1498,7 @@
           <a:p>
             <a:fld id="{27EF7898-89F7-4221-9DBC-7891136EA364}" type="datetimeFigureOut">
               <a:rPr lang="de-AT" smtClean="0"/>
-              <a:t>14.06.2024</a:t>
+              <a:t>18.06.2024</a:t>
             </a:fld>
             <a:endParaRPr lang="de-AT"/>
           </a:p>
@@ -1747,7 +1839,7 @@
           <a:p>
             <a:fld id="{27EF7898-89F7-4221-9DBC-7891136EA364}" type="datetimeFigureOut">
               <a:rPr lang="de-AT" smtClean="0"/>
-              <a:t>14.06.2024</a:t>
+              <a:t>18.06.2024</a:t>
             </a:fld>
             <a:endParaRPr lang="de-AT"/>
           </a:p>
@@ -2061,7 +2153,7 @@
           <a:p>
             <a:fld id="{27EF7898-89F7-4221-9DBC-7891136EA364}" type="datetimeFigureOut">
               <a:rPr lang="de-AT" smtClean="0"/>
-              <a:t>14.06.2024</a:t>
+              <a:t>18.06.2024</a:t>
             </a:fld>
             <a:endParaRPr lang="de-AT"/>
           </a:p>
@@ -2454,7 +2546,7 @@
           <a:p>
             <a:fld id="{27EF7898-89F7-4221-9DBC-7891136EA364}" type="datetimeFigureOut">
               <a:rPr lang="de-AT" smtClean="0"/>
-              <a:t>14.06.2024</a:t>
+              <a:t>18.06.2024</a:t>
             </a:fld>
             <a:endParaRPr lang="de-AT"/>
           </a:p>
@@ -2624,7 +2716,7 @@
           <a:p>
             <a:fld id="{27EF7898-89F7-4221-9DBC-7891136EA364}" type="datetimeFigureOut">
               <a:rPr lang="de-AT" smtClean="0"/>
-              <a:t>14.06.2024</a:t>
+              <a:t>18.06.2024</a:t>
             </a:fld>
             <a:endParaRPr lang="de-AT"/>
           </a:p>
@@ -2804,7 +2896,7 @@
           <a:p>
             <a:fld id="{27EF7898-89F7-4221-9DBC-7891136EA364}" type="datetimeFigureOut">
               <a:rPr lang="de-AT" smtClean="0"/>
-              <a:t>14.06.2024</a:t>
+              <a:t>18.06.2024</a:t>
             </a:fld>
             <a:endParaRPr lang="de-AT"/>
           </a:p>
@@ -2980,7 +3072,7 @@
           <a:p>
             <a:fld id="{27EF7898-89F7-4221-9DBC-7891136EA364}" type="datetimeFigureOut">
               <a:rPr lang="de-AT" smtClean="0"/>
-              <a:t>14.06.2024</a:t>
+              <a:t>18.06.2024</a:t>
             </a:fld>
             <a:endParaRPr lang="de-AT"/>
           </a:p>
@@ -3227,7 +3319,7 @@
           <a:p>
             <a:fld id="{27EF7898-89F7-4221-9DBC-7891136EA364}" type="datetimeFigureOut">
               <a:rPr lang="de-AT" smtClean="0"/>
-              <a:t>14.06.2024</a:t>
+              <a:t>18.06.2024</a:t>
             </a:fld>
             <a:endParaRPr lang="de-AT"/>
           </a:p>
@@ -3459,7 +3551,7 @@
           <a:p>
             <a:fld id="{27EF7898-89F7-4221-9DBC-7891136EA364}" type="datetimeFigureOut">
               <a:rPr lang="de-AT" smtClean="0"/>
-              <a:t>14.06.2024</a:t>
+              <a:t>18.06.2024</a:t>
             </a:fld>
             <a:endParaRPr lang="de-AT"/>
           </a:p>
@@ -3833,7 +3925,7 @@
           <a:p>
             <a:fld id="{27EF7898-89F7-4221-9DBC-7891136EA364}" type="datetimeFigureOut">
               <a:rPr lang="de-AT" smtClean="0"/>
-              <a:t>14.06.2024</a:t>
+              <a:t>18.06.2024</a:t>
             </a:fld>
             <a:endParaRPr lang="de-AT"/>
           </a:p>
@@ -3956,7 +4048,7 @@
           <a:p>
             <a:fld id="{27EF7898-89F7-4221-9DBC-7891136EA364}" type="datetimeFigureOut">
               <a:rPr lang="de-AT" smtClean="0"/>
-              <a:t>14.06.2024</a:t>
+              <a:t>18.06.2024</a:t>
             </a:fld>
             <a:endParaRPr lang="de-AT"/>
           </a:p>
@@ -4051,7 +4143,7 @@
           <a:p>
             <a:fld id="{27EF7898-89F7-4221-9DBC-7891136EA364}" type="datetimeFigureOut">
               <a:rPr lang="de-AT" smtClean="0"/>
-              <a:t>14.06.2024</a:t>
+              <a:t>18.06.2024</a:t>
             </a:fld>
             <a:endParaRPr lang="de-AT"/>
           </a:p>
@@ -4306,7 +4398,7 @@
           <a:p>
             <a:fld id="{27EF7898-89F7-4221-9DBC-7891136EA364}" type="datetimeFigureOut">
               <a:rPr lang="de-AT" smtClean="0"/>
-              <a:t>14.06.2024</a:t>
+              <a:t>18.06.2024</a:t>
             </a:fld>
             <a:endParaRPr lang="de-AT"/>
           </a:p>
@@ -4569,7 +4661,7 @@
           <a:p>
             <a:fld id="{27EF7898-89F7-4221-9DBC-7891136EA364}" type="datetimeFigureOut">
               <a:rPr lang="de-AT" smtClean="0"/>
-              <a:t>14.06.2024</a:t>
+              <a:t>18.06.2024</a:t>
             </a:fld>
             <a:endParaRPr lang="de-AT"/>
           </a:p>
@@ -5312,7 +5404,7 @@
           <a:p>
             <a:fld id="{27EF7898-89F7-4221-9DBC-7891136EA364}" type="datetimeFigureOut">
               <a:rPr lang="de-AT" smtClean="0"/>
-              <a:t>14.06.2024</a:t>
+              <a:t>18.06.2024</a:t>
             </a:fld>
             <a:endParaRPr lang="de-AT"/>
           </a:p>
@@ -6818,7 +6910,7 @@
             <a:spLocks noGrp="1"/>
           </p:cNvSpPr>
           <p:nvPr>
-            <p:ph idx="1"/>
+            <p:ph sz="half" idx="1"/>
           </p:nvPr>
         </p:nvSpPr>
         <p:spPr/>
@@ -6833,6 +6925,77 @@
           </a:p>
         </p:txBody>
       </p:sp>
+      <p:pic>
+        <p:nvPicPr>
+          <p:cNvPr id="6" name="Inhaltsplatzhalter 5" descr="Ein Bild, das Reihe, Diagramm, Rechteck, Design enthält.&#10;&#10;Automatisch generierte Beschreibung">
+            <a:extLst>
+              <a:ext uri="{FF2B5EF4-FFF2-40B4-BE49-F238E27FC236}">
+                <a16:creationId xmlns:a16="http://schemas.microsoft.com/office/drawing/2014/main" id="{4A811720-F0C7-7F67-65F8-1C8F6CE1EF88}"/>
+              </a:ext>
+            </a:extLst>
+          </p:cNvPr>
+          <p:cNvPicPr>
+            <a:picLocks noGrp="1" noChangeAspect="1"/>
+          </p:cNvPicPr>
+          <p:nvPr>
+            <p:ph sz="half" idx="2"/>
+          </p:nvPr>
+        </p:nvPicPr>
+        <p:blipFill>
+          <a:blip r:embed="rId2">
+            <a:extLst>
+              <a:ext uri="{28A0092B-C50C-407E-A947-70E740481C1C}">
+                <a14:useLocalDpi xmlns:a14="http://schemas.microsoft.com/office/drawing/2010/main" val="0"/>
+              </a:ext>
+            </a:extLst>
+          </a:blip>
+          <a:stretch>
+            <a:fillRect/>
+          </a:stretch>
+        </p:blipFill>
+        <p:spPr>
+          <a:xfrm>
+            <a:off x="0" y="1244781"/>
+            <a:ext cx="9476220" cy="2679936"/>
+          </a:xfrm>
+        </p:spPr>
+      </p:pic>
+      <p:pic>
+        <p:nvPicPr>
+          <p:cNvPr id="10" name="Grafik 9" descr="Ein Bild, das Text, Schrift, Reihe, Diagramm enthält.&#10;&#10;Automatisch generierte Beschreibung">
+            <a:extLst>
+              <a:ext uri="{FF2B5EF4-FFF2-40B4-BE49-F238E27FC236}">
+                <a16:creationId xmlns:a16="http://schemas.microsoft.com/office/drawing/2014/main" id="{4770E9F8-8A12-21ED-6AEA-26F04998D43D}"/>
+              </a:ext>
+            </a:extLst>
+          </p:cNvPr>
+          <p:cNvPicPr>
+            <a:picLocks noChangeAspect="1"/>
+          </p:cNvPicPr>
+          <p:nvPr/>
+        </p:nvPicPr>
+        <p:blipFill>
+          <a:blip r:embed="rId3">
+            <a:extLst>
+              <a:ext uri="{28A0092B-C50C-407E-A947-70E740481C1C}">
+                <a14:useLocalDpi xmlns:a14="http://schemas.microsoft.com/office/drawing/2010/main" val="0"/>
+              </a:ext>
+            </a:extLst>
+          </a:blip>
+          <a:stretch>
+            <a:fillRect/>
+          </a:stretch>
+        </p:blipFill>
+        <p:spPr>
+          <a:xfrm>
+            <a:off x="0" y="4008611"/>
+            <a:ext cx="12192000" cy="3447979"/>
+          </a:xfrm>
+          <a:prstGeom prst="rect">
+            <a:avLst/>
+          </a:prstGeom>
+        </p:spPr>
+      </p:pic>
     </p:spTree>
     <p:extLst>
       <p:ext uri="{BB962C8B-B14F-4D97-AF65-F5344CB8AC3E}">
@@ -7047,7 +7210,7 @@
         </p:blipFill>
         <p:spPr>
           <a:xfrm>
-            <a:off x="832757" y="2187842"/>
+            <a:off x="832757" y="2250595"/>
             <a:ext cx="10526486" cy="4670158"/>
           </a:xfrm>
           <a:prstGeom prst="rect">

</xml_diff>

<commit_message>
added some cool stuff
</commit_message>
<xml_diff>
--- a/Documentation/Beer Data Presentation - Resampling Task.pptx
+++ b/Documentation/Beer Data Presentation - Resampling Task.pptx
@@ -129,6 +129,60 @@
 
 <file path=ppt/changesInfos/changesInfo1.xml><?xml version="1.0" encoding="utf-8"?>
 <pc:chgInfo xmlns:a="http://schemas.openxmlformats.org/drawingml/2006/main" xmlns:r="http://schemas.openxmlformats.org/officeDocument/2006/relationships" xmlns:ac="http://schemas.microsoft.com/office/drawing/2013/main/command" xmlns:pc="http://schemas.microsoft.com/office/powerpoint/2013/main/command">
+  <pc:docChgLst>
+    <pc:chgData name="Debnar Marcus - s2310454007" userId="a4131e1e-6e67-4fcb-9b71-1c3d9633441c" providerId="ADAL" clId="{0EE41FFC-C790-45C9-B98A-D9E15A145E28}"/>
+    <pc:docChg chg="undo custSel modSld">
+      <pc:chgData name="Debnar Marcus - s2310454007" userId="a4131e1e-6e67-4fcb-9b71-1c3d9633441c" providerId="ADAL" clId="{0EE41FFC-C790-45C9-B98A-D9E15A145E28}" dt="2024-06-18T14:34:37.313" v="3" actId="1076"/>
+      <pc:docMkLst>
+        <pc:docMk/>
+      </pc:docMkLst>
+      <pc:sldChg chg="modSp mod">
+        <pc:chgData name="Debnar Marcus - s2310454007" userId="a4131e1e-6e67-4fcb-9b71-1c3d9633441c" providerId="ADAL" clId="{0EE41FFC-C790-45C9-B98A-D9E15A145E28}" dt="2024-06-18T14:06:09.645" v="2" actId="1076"/>
+        <pc:sldMkLst>
+          <pc:docMk/>
+          <pc:sldMk cId="1347939303" sldId="257"/>
+        </pc:sldMkLst>
+        <pc:spChg chg="mod">
+          <ac:chgData name="Debnar Marcus - s2310454007" userId="a4131e1e-6e67-4fcb-9b71-1c3d9633441c" providerId="ADAL" clId="{0EE41FFC-C790-45C9-B98A-D9E15A145E28}" dt="2024-06-18T14:06:09.645" v="2" actId="1076"/>
+          <ac:spMkLst>
+            <pc:docMk/>
+            <pc:sldMk cId="1347939303" sldId="257"/>
+            <ac:spMk id="2" creationId="{824A958F-EF44-5E30-E625-FD082D6CF6B6}"/>
+          </ac:spMkLst>
+        </pc:spChg>
+      </pc:sldChg>
+      <pc:sldChg chg="modSp mod">
+        <pc:chgData name="Debnar Marcus - s2310454007" userId="a4131e1e-6e67-4fcb-9b71-1c3d9633441c" providerId="ADAL" clId="{0EE41FFC-C790-45C9-B98A-D9E15A145E28}" dt="2024-06-18T14:01:56.304" v="0" actId="1076"/>
+        <pc:sldMkLst>
+          <pc:docMk/>
+          <pc:sldMk cId="1013569420" sldId="260"/>
+        </pc:sldMkLst>
+        <pc:spChg chg="mod">
+          <ac:chgData name="Debnar Marcus - s2310454007" userId="a4131e1e-6e67-4fcb-9b71-1c3d9633441c" providerId="ADAL" clId="{0EE41FFC-C790-45C9-B98A-D9E15A145E28}" dt="2024-06-18T14:01:56.304" v="0" actId="1076"/>
+          <ac:spMkLst>
+            <pc:docMk/>
+            <pc:sldMk cId="1013569420" sldId="260"/>
+            <ac:spMk id="3" creationId="{008D4B6F-A5DC-D20C-7812-7B001DE06B6F}"/>
+          </ac:spMkLst>
+        </pc:spChg>
+      </pc:sldChg>
+      <pc:sldChg chg="modSp mod">
+        <pc:chgData name="Debnar Marcus - s2310454007" userId="a4131e1e-6e67-4fcb-9b71-1c3d9633441c" providerId="ADAL" clId="{0EE41FFC-C790-45C9-B98A-D9E15A145E28}" dt="2024-06-18T14:34:37.313" v="3" actId="1076"/>
+        <pc:sldMkLst>
+          <pc:docMk/>
+          <pc:sldMk cId="421467146" sldId="261"/>
+        </pc:sldMkLst>
+        <pc:picChg chg="mod">
+          <ac:chgData name="Debnar Marcus - s2310454007" userId="a4131e1e-6e67-4fcb-9b71-1c3d9633441c" providerId="ADAL" clId="{0EE41FFC-C790-45C9-B98A-D9E15A145E28}" dt="2024-06-18T14:34:37.313" v="3" actId="1076"/>
+          <ac:picMkLst>
+            <pc:docMk/>
+            <pc:sldMk cId="421467146" sldId="261"/>
+            <ac:picMk id="10" creationId="{4770E9F8-8A12-21ED-6AEA-26F04998D43D}"/>
+          </ac:picMkLst>
+        </pc:picChg>
+      </pc:sldChg>
+    </pc:docChg>
+  </pc:docChgLst>
   <pc:docChgLst>
     <pc:chgData name="Debnar Marcus - s2310454007" userId="a4131e1e-6e67-4fcb-9b71-1c3d9633441c" providerId="ADAL" clId="{6FF64505-D837-4B4E-811A-3D0F901EFB2F}"/>
     <pc:docChg chg="custSel modSld">
@@ -6120,7 +6174,12 @@
             <p:ph idx="1"/>
           </p:nvPr>
         </p:nvSpPr>
-        <p:spPr/>
+        <p:spPr>
+          <a:xfrm>
+            <a:off x="813136" y="1997627"/>
+            <a:ext cx="8596668" cy="3880773"/>
+          </a:xfrm>
+        </p:spPr>
         <p:txBody>
           <a:bodyPr/>
           <a:lstStyle/>
@@ -6988,7 +7047,7 @@
         </p:blipFill>
         <p:spPr>
           <a:xfrm>
-            <a:off x="0" y="4008611"/>
+            <a:off x="0" y="3818489"/>
             <a:ext cx="12192000" cy="3447979"/>
           </a:xfrm>
           <a:prstGeom prst="rect">

</xml_diff>